<commit_message>
Update Opening Slides for Use Case Session
</commit_message>
<xml_diff>
--- a/PRESENTATIONS/2021-03-online-f2f/2021-03-18-WoT-F2F-Opening-McCool.pptx
+++ b/PRESENTATIONS/2021-03-online-f2f/2021-03-18-WoT-F2F-Opening-McCool.pptx
@@ -211,7 +211,7 @@
           <a:p>
             <a:fld id="{8389B5DD-0274-BF45-B4C5-62E173E8F634}" type="datetimeFigureOut">
               <a:rPr lang="en-US" smtClean="0"/>
-              <a:t>3/9/21</a:t>
+              <a:t>3/18/21</a:t>
             </a:fld>
             <a:endParaRPr lang="en-US"/>
           </a:p>
@@ -369,7 +369,7 @@
           <a:p>
             <a:fld id="{C8816669-4A9E-2244-B321-FE3C257B743B}" type="slidenum">
               <a:rPr lang="en-US" smtClean="0"/>
-              <a:t>‹#›</a:t>
+              <a:t>‹Nr.›</a:t>
             </a:fld>
             <a:endParaRPr lang="en-US"/>
           </a:p>
@@ -827,7 +827,7 @@
           <a:p>
             <a:fld id="{2F93E591-CC8D-C74E-8EED-098A7FB5E64D}" type="datetime1">
               <a:rPr lang="en-CA" smtClean="0"/>
-              <a:t>2021-03-09</a:t>
+              <a:t>2021-03-18</a:t>
             </a:fld>
             <a:endParaRPr lang="en-US"/>
           </a:p>
@@ -900,7 +900,7 @@
           <a:p>
             <a:fld id="{055BDE2E-7167-1944-9FEE-E44668D91CB6}" type="slidenum">
               <a:rPr lang="en-US" smtClean="0"/>
-              <a:t>‹#›</a:t>
+              <a:t>‹Nr.›</a:t>
             </a:fld>
             <a:endParaRPr lang="en-US"/>
           </a:p>
@@ -1095,7 +1095,7 @@
           <a:p>
             <a:fld id="{2E1BC118-574D-594E-ABEA-A7C82666C9AB}" type="datetime1">
               <a:rPr lang="en-CA" smtClean="0"/>
-              <a:t>2021-03-09</a:t>
+              <a:t>2021-03-18</a:t>
             </a:fld>
             <a:endParaRPr lang="en-US"/>
           </a:p>
@@ -1168,7 +1168,7 @@
           <a:p>
             <a:fld id="{055BDE2E-7167-1944-9FEE-E44668D91CB6}" type="slidenum">
               <a:rPr lang="en-US" smtClean="0"/>
-              <a:t>‹#›</a:t>
+              <a:t>‹Nr.›</a:t>
             </a:fld>
             <a:endParaRPr lang="en-US"/>
           </a:p>
@@ -1394,7 +1394,7 @@
           <a:p>
             <a:fld id="{055BDE2E-7167-1944-9FEE-E44668D91CB6}" type="slidenum">
               <a:rPr lang="en-US" smtClean="0"/>
-              <a:t>‹#›</a:t>
+              <a:t>‹Nr.›</a:t>
             </a:fld>
             <a:endParaRPr lang="en-US"/>
           </a:p>
@@ -1461,7 +1461,7 @@
           <a:p>
             <a:fld id="{B929AB1E-7FD9-0A40-B7C0-508CCACB3E9A}" type="datetime1">
               <a:rPr lang="en-CA" smtClean="0"/>
-              <a:t>2021-03-09</a:t>
+              <a:t>2021-03-18</a:t>
             </a:fld>
             <a:endParaRPr lang="en-US"/>
           </a:p>
@@ -1693,7 +1693,7 @@
           <a:p>
             <a:fld id="{5AE8723F-57EA-4C47-97B9-92AFDEEF85DC}" type="datetime1">
               <a:rPr lang="en-CA" smtClean="0"/>
-              <a:t>2021-03-09</a:t>
+              <a:t>2021-03-18</a:t>
             </a:fld>
             <a:endParaRPr lang="en-US"/>
           </a:p>
@@ -1766,7 +1766,7 @@
           <a:p>
             <a:fld id="{055BDE2E-7167-1944-9FEE-E44668D91CB6}" type="slidenum">
               <a:rPr lang="en-US" smtClean="0"/>
-              <a:t>‹#›</a:t>
+              <a:t>‹Nr.›</a:t>
             </a:fld>
             <a:endParaRPr lang="en-US"/>
           </a:p>
@@ -2023,7 +2023,7 @@
           <a:p>
             <a:fld id="{B2B00E5D-EC04-AA49-8D52-0FCB6E08F63D}" type="datetime1">
               <a:rPr lang="en-CA" smtClean="0"/>
-              <a:t>2021-03-09</a:t>
+              <a:t>2021-03-18</a:t>
             </a:fld>
             <a:endParaRPr lang="en-US"/>
           </a:p>
@@ -2096,7 +2096,7 @@
           <a:p>
             <a:fld id="{055BDE2E-7167-1944-9FEE-E44668D91CB6}" type="slidenum">
               <a:rPr lang="en-US" smtClean="0"/>
-              <a:t>‹#›</a:t>
+              <a:t>‹Nr.›</a:t>
             </a:fld>
             <a:endParaRPr lang="en-US"/>
           </a:p>
@@ -2496,7 +2496,7 @@
           <a:p>
             <a:fld id="{FF90905C-10FF-8047-AA7E-6DC7E8B6AF51}" type="datetime1">
               <a:rPr lang="en-CA" smtClean="0"/>
-              <a:t>2021-03-09</a:t>
+              <a:t>2021-03-18</a:t>
             </a:fld>
             <a:endParaRPr lang="en-US"/>
           </a:p>
@@ -2569,7 +2569,7 @@
           <a:p>
             <a:fld id="{055BDE2E-7167-1944-9FEE-E44668D91CB6}" type="slidenum">
               <a:rPr lang="en-US" smtClean="0"/>
-              <a:t>‹#›</a:t>
+              <a:t>‹Nr.›</a:t>
             </a:fld>
             <a:endParaRPr lang="en-US"/>
           </a:p>
@@ -2702,7 +2702,7 @@
           <a:p>
             <a:fld id="{D1CE86E2-4400-D342-BEEC-F9C1ADF6F9F7}" type="datetime1">
               <a:rPr lang="en-CA" smtClean="0"/>
-              <a:t>2021-03-09</a:t>
+              <a:t>2021-03-18</a:t>
             </a:fld>
             <a:endParaRPr lang="en-US"/>
           </a:p>
@@ -2775,7 +2775,7 @@
           <a:p>
             <a:fld id="{055BDE2E-7167-1944-9FEE-E44668D91CB6}" type="slidenum">
               <a:rPr lang="en-US" smtClean="0"/>
-              <a:t>‹#›</a:t>
+              <a:t>‹Nr.›</a:t>
             </a:fld>
             <a:endParaRPr lang="en-US"/>
           </a:p>
@@ -2872,7 +2872,7 @@
           <a:p>
             <a:fld id="{74358A08-7221-7F45-8378-69D5559861DD}" type="datetime1">
               <a:rPr lang="en-CA" smtClean="0"/>
-              <a:t>2021-03-09</a:t>
+              <a:t>2021-03-18</a:t>
             </a:fld>
             <a:endParaRPr lang="en-US"/>
           </a:p>
@@ -2945,7 +2945,7 @@
           <a:p>
             <a:fld id="{055BDE2E-7167-1944-9FEE-E44668D91CB6}" type="slidenum">
               <a:rPr lang="en-US" smtClean="0"/>
-              <a:t>‹#›</a:t>
+              <a:t>‹Nr.›</a:t>
             </a:fld>
             <a:endParaRPr lang="en-US"/>
           </a:p>
@@ -3244,7 +3244,7 @@
           <a:p>
             <a:fld id="{08C20FDB-303D-8A4E-83B7-226DD88B97BD}" type="datetime1">
               <a:rPr lang="en-CA" smtClean="0"/>
-              <a:t>2021-03-09</a:t>
+              <a:t>2021-03-18</a:t>
             </a:fld>
             <a:endParaRPr lang="en-US"/>
           </a:p>
@@ -3317,7 +3317,7 @@
           <a:p>
             <a:fld id="{055BDE2E-7167-1944-9FEE-E44668D91CB6}" type="slidenum">
               <a:rPr lang="en-US" smtClean="0"/>
-              <a:t>‹#›</a:t>
+              <a:t>‹Nr.›</a:t>
             </a:fld>
             <a:endParaRPr lang="en-US"/>
           </a:p>
@@ -3596,7 +3596,7 @@
           <a:p>
             <a:fld id="{0A9EBA37-9D18-D34A-A88D-1B00AA06E95C}" type="datetime1">
               <a:rPr lang="en-CA" smtClean="0"/>
-              <a:t>2021-03-09</a:t>
+              <a:t>2021-03-18</a:t>
             </a:fld>
             <a:endParaRPr lang="en-US"/>
           </a:p>
@@ -3669,7 +3669,7 @@
           <a:p>
             <a:fld id="{055BDE2E-7167-1944-9FEE-E44668D91CB6}" type="slidenum">
               <a:rPr lang="en-US" smtClean="0"/>
-              <a:t>‹#›</a:t>
+              <a:t>‹Nr.›</a:t>
             </a:fld>
             <a:endParaRPr lang="en-US"/>
           </a:p>
@@ -3936,7 +3936,7 @@
             <a:fld id="{B73A2E78-F38A-E046-ACDB-668F070D1EF6}" type="datetime1">
               <a:rPr lang="en-CA" smtClean="0"/>
               <a:pPr/>
-              <a:t>2021-03-09</a:t>
+              <a:t>2021-03-18</a:t>
             </a:fld>
             <a:endParaRPr lang="en-US" dirty="0"/>
           </a:p>
@@ -3985,7 +3985,7 @@
             <a:fld id="{055BDE2E-7167-1944-9FEE-E44668D91CB6}" type="slidenum">
               <a:rPr lang="en-US" smtClean="0"/>
               <a:pPr/>
-              <a:t>‹#›</a:t>
+              <a:t>‹Nr.›</a:t>
             </a:fld>
             <a:endParaRPr lang="en-US" dirty="0"/>
           </a:p>
@@ -4331,7 +4331,9 @@
         </p:nvSpPr>
         <p:spPr/>
         <p:txBody>
-          <a:bodyPr/>
+          <a:bodyPr>
+            <a:normAutofit fontScale="90000"/>
+          </a:bodyPr>
           <a:lstStyle/>
           <a:p>
             <a:r>
@@ -4371,17 +4373,18 @@
           <a:p>
             <a:r>
               <a:rPr lang="en-US" dirty="0"/>
-              <a:t>Michael McCool</a:t>
-            </a:r>
-          </a:p>
-          <a:p>
-            <a:r>
-              <a:rPr lang="en-US"/>
-              <a:t>18 </a:t>
-            </a:r>
+              <a:t>Sebastian </a:t>
+            </a:r>
+            <a:r>
+              <a:rPr lang="en-US" dirty="0" err="1"/>
+              <a:t>Kaebisch</a:t>
+            </a:r>
+            <a:endParaRPr lang="en-US" dirty="0"/>
+          </a:p>
+          <a:p>
             <a:r>
               <a:rPr lang="en-US" dirty="0"/>
-              <a:t>March 2021</a:t>
+              <a:t>18 March 2021</a:t>
             </a:r>
           </a:p>
         </p:txBody>
@@ -4577,7 +4580,7 @@
           <a:p>
             <a:fld id="{BF92DA42-2970-1B4D-9C1F-77F249CD7467}" type="datetime1">
               <a:rPr lang="en-CA" smtClean="0"/>
-              <a:t>2021-03-09</a:t>
+              <a:t>2021-03-18</a:t>
             </a:fld>
             <a:endParaRPr lang="en-US" dirty="0"/>
           </a:p>
@@ -4965,7 +4968,7 @@
           <a:p>
             <a:r>
               <a:rPr lang="en-CA" b="1" dirty="0"/>
-              <a:t>IG: Monday March 18 (2h)</a:t>
+              <a:t>IG: Thursday March 18 (2h)</a:t>
             </a:r>
             <a:r>
               <a:rPr lang="en-CA" dirty="0"/>
@@ -5016,14 +5019,54 @@
           <a:p>
             <a:r>
               <a:rPr lang="en-CA" b="1" dirty="0"/>
-              <a:t>Use Cases (1h50m)</a:t>
+              <a:t>Use Cases (Michael </a:t>
+            </a:r>
+            <a:r>
+              <a:rPr lang="en-CA" b="1" dirty="0" err="1"/>
+              <a:t>Lagally</a:t>
+            </a:r>
+            <a:r>
+              <a:rPr lang="en-CA" b="1" dirty="0"/>
+              <a:t>) (1h50m)</a:t>
             </a:r>
           </a:p>
           <a:p>
             <a:pPr lvl="1"/>
             <a:r>
               <a:rPr lang="en-CA" dirty="0"/>
-              <a:t>Review of draft Use Case document</a:t>
+              <a:t>Introduction to </a:t>
+            </a:r>
+            <a:r>
+              <a:rPr lang="en-CA" dirty="0" err="1"/>
+              <a:t>WoT</a:t>
+            </a:r>
+            <a:r>
+              <a:rPr lang="en-CA" dirty="0"/>
+              <a:t> Use Cases and Requirements IG</a:t>
+            </a:r>
+          </a:p>
+          <a:p>
+            <a:pPr lvl="1"/>
+            <a:r>
+              <a:rPr lang="en-CA" dirty="0"/>
+              <a:t>Wot Use Cases document presentation and review: </a:t>
+            </a:r>
+            <a:br>
+              <a:rPr lang="en-CA" dirty="0"/>
+            </a:br>
+            <a:r>
+              <a:rPr lang="en-CA" dirty="0">
+                <a:hlinkClick r:id="rId2"/>
+              </a:rPr>
+              <a:t>http://w3c.github.io/wot-usecases/</a:t>
+            </a:r>
+            <a:endParaRPr lang="en-CA" dirty="0"/>
+          </a:p>
+          <a:p>
+            <a:pPr lvl="1"/>
+            <a:r>
+              <a:rPr lang="en-CA" dirty="0"/>
+              <a:t>Tentative approval, planning for resolution in first main call following F2F</a:t>
             </a:r>
           </a:p>
           <a:p>
@@ -5121,7 +5164,7 @@
           <a:p>
             <a:fld id="{B929AB1E-7FD9-0A40-B7C0-508CCACB3E9A}" type="datetime1">
               <a:rPr lang="en-CA" smtClean="0"/>
-              <a:t>2021-03-09</a:t>
+              <a:t>2021-03-18</a:t>
             </a:fld>
             <a:endParaRPr lang="en-US"/>
           </a:p>
@@ -5339,7 +5382,7 @@
           <a:p>
             <a:fld id="{BF92DA42-2970-1B4D-9C1F-77F249CD7467}" type="datetime1">
               <a:rPr lang="en-CA" smtClean="0"/>
-              <a:t>2021-03-09</a:t>
+              <a:t>2021-03-18</a:t>
             </a:fld>
             <a:endParaRPr lang="en-US" dirty="0"/>
           </a:p>

</xml_diff>